<commit_message>
rest, spread, and object literals
</commit_message>
<xml_diff>
--- a/13_RestOper.pptx
+++ b/13_RestOper.pptx
@@ -214,7 +214,7 @@
             <a:fld id="{6837EDA8-41C8-4B24-A206-13C08A65A6D7}" type="datetimeFigureOut">
               <a:rPr lang="zh-TW" altLang="en-US" smtClean="0"/>
               <a:pPr/>
-              <a:t>2020/4/15</a:t>
+              <a:t>2020/4/20</a:t>
             </a:fld>
             <a:endParaRPr lang="zh-TW" altLang="en-US"/>
           </a:p>
@@ -667,7 +667,7 @@
             <a:fld id="{8B85509C-BD4F-47BF-9B1E-FC2E949B3621}" type="datetime1">
               <a:rPr lang="zh-TW" altLang="en-US" smtClean="0"/>
               <a:pPr/>
-              <a:t>2020/4/15</a:t>
+              <a:t>2020/4/20</a:t>
             </a:fld>
             <a:endParaRPr lang="zh-TW" altLang="en-US"/>
           </a:p>
@@ -840,7 +840,7 @@
             <a:fld id="{42251B24-F787-4C15-8A0F-7AEC20C70069}" type="datetime1">
               <a:rPr lang="zh-TW" altLang="en-US" smtClean="0"/>
               <a:pPr/>
-              <a:t>2020/4/15</a:t>
+              <a:t>2020/4/20</a:t>
             </a:fld>
             <a:endParaRPr lang="zh-TW" altLang="en-US"/>
           </a:p>
@@ -1015,7 +1015,7 @@
             <a:fld id="{9CA0D33C-CE2B-45F1-B8D4-FFD1F131F331}" type="datetime1">
               <a:rPr lang="zh-TW" altLang="en-US" smtClean="0"/>
               <a:pPr/>
-              <a:t>2020/4/15</a:t>
+              <a:t>2020/4/20</a:t>
             </a:fld>
             <a:endParaRPr lang="zh-TW" altLang="en-US"/>
           </a:p>
@@ -1180,7 +1180,7 @@
             <a:fld id="{50B99440-D9EF-40CC-9B52-F6428D9B2C76}" type="datetime1">
               <a:rPr lang="zh-TW" altLang="en-US" smtClean="0"/>
               <a:pPr/>
-              <a:t>2020/4/15</a:t>
+              <a:t>2020/4/20</a:t>
             </a:fld>
             <a:endParaRPr lang="zh-TW" altLang="en-US"/>
           </a:p>
@@ -1422,7 +1422,7 @@
             <a:fld id="{0871BF52-5C6C-4959-8E27-CECB68D39FE4}" type="datetime1">
               <a:rPr lang="zh-TW" altLang="en-US" smtClean="0"/>
               <a:pPr/>
-              <a:t>2020/4/15</a:t>
+              <a:t>2020/4/20</a:t>
             </a:fld>
             <a:endParaRPr lang="zh-TW" altLang="en-US"/>
           </a:p>
@@ -1704,7 +1704,7 @@
             <a:fld id="{DF863F05-2DD9-4EB1-A827-12FD992DE9DC}" type="datetime1">
               <a:rPr lang="zh-TW" altLang="en-US" smtClean="0"/>
               <a:pPr/>
-              <a:t>2020/4/15</a:t>
+              <a:t>2020/4/20</a:t>
             </a:fld>
             <a:endParaRPr lang="zh-TW" altLang="en-US"/>
           </a:p>
@@ -2120,7 +2120,7 @@
             <a:fld id="{6339AF51-4491-4873-A096-75DB6CE47516}" type="datetime1">
               <a:rPr lang="zh-TW" altLang="en-US" smtClean="0"/>
               <a:pPr/>
-              <a:t>2020/4/15</a:t>
+              <a:t>2020/4/20</a:t>
             </a:fld>
             <a:endParaRPr lang="zh-TW" altLang="en-US"/>
           </a:p>
@@ -2234,7 +2234,7 @@
             <a:fld id="{EE4AD9C8-8B9E-40FF-ABE2-858AC2057BBB}" type="datetime1">
               <a:rPr lang="zh-TW" altLang="en-US" smtClean="0"/>
               <a:pPr/>
-              <a:t>2020/4/15</a:t>
+              <a:t>2020/4/20</a:t>
             </a:fld>
             <a:endParaRPr lang="zh-TW" altLang="en-US"/>
           </a:p>
@@ -2326,7 +2326,7 @@
             <a:fld id="{B4784999-BBBE-4BE4-A8D0-877E7D1D66CC}" type="datetime1">
               <a:rPr lang="zh-TW" altLang="en-US" smtClean="0"/>
               <a:pPr/>
-              <a:t>2020/4/15</a:t>
+              <a:t>2020/4/20</a:t>
             </a:fld>
             <a:endParaRPr lang="zh-TW" altLang="en-US"/>
           </a:p>
@@ -2598,7 +2598,7 @@
             <a:fld id="{E88D17E6-02BD-4944-B9FE-7BFCCBF83D48}" type="datetime1">
               <a:rPr lang="zh-TW" altLang="en-US" smtClean="0"/>
               <a:pPr/>
-              <a:t>2020/4/15</a:t>
+              <a:t>2020/4/20</a:t>
             </a:fld>
             <a:endParaRPr lang="zh-TW" altLang="en-US"/>
           </a:p>
@@ -2847,7 +2847,7 @@
             <a:fld id="{3C13E23D-1FEF-4D78-A3A3-3D6F2BB31954}" type="datetime1">
               <a:rPr lang="zh-TW" altLang="en-US" smtClean="0"/>
               <a:pPr/>
-              <a:t>2020/4/15</a:t>
+              <a:t>2020/4/20</a:t>
             </a:fld>
             <a:endParaRPr lang="zh-TW" altLang="en-US"/>
           </a:p>
@@ -3055,7 +3055,7 @@
             <a:fld id="{06197F35-AD6F-4594-8B50-334492D2E7E8}" type="datetime1">
               <a:rPr lang="zh-TW" altLang="en-US" smtClean="0"/>
               <a:pPr/>
-              <a:t>2020/4/15</a:t>
+              <a:t>2020/4/20</a:t>
             </a:fld>
             <a:endParaRPr lang="zh-TW" altLang="en-US"/>
           </a:p>
@@ -3516,7 +3516,7 @@
             <a:fld id="{C389EDC9-19E3-47AC-9C57-C6A24DEA81AD}" type="datetime1">
               <a:rPr lang="zh-TW" altLang="en-US" smtClean="0"/>
               <a:pPr/>
-              <a:t>2020/4/15</a:t>
+              <a:t>2020/4/20</a:t>
             </a:fld>
             <a:endParaRPr lang="zh-TW" altLang="en-US"/>
           </a:p>
@@ -3840,7 +3840,7 @@
             <a:fld id="{A4F910E6-8D00-4BAF-8C48-9688E0B449D3}" type="datetime1">
               <a:rPr lang="zh-TW" altLang="en-US" smtClean="0"/>
               <a:pPr/>
-              <a:t>2020/4/15</a:t>
+              <a:t>2020/4/20</a:t>
             </a:fld>
             <a:endParaRPr lang="zh-TW" altLang="en-US"/>
           </a:p>
@@ -4057,7 +4057,7 @@
                   <a:schemeClr val="tx1"/>
                 </a:solidFill>
               </a:rPr>
-              <a:t>Rest Operator (…) extract the array into separated elements.</a:t>
+              <a:t>Rest Operator (…) extract the separated elements into a array.</a:t>
             </a:r>
           </a:p>
         </p:txBody>
@@ -4139,7 +4139,7 @@
             <a:fld id="{A4F910E6-8D00-4BAF-8C48-9688E0B449D3}" type="datetime1">
               <a:rPr lang="zh-TW" altLang="en-US" smtClean="0"/>
               <a:pPr/>
-              <a:t>2020/4/15</a:t>
+              <a:t>2020/4/20</a:t>
             </a:fld>
             <a:endParaRPr lang="zh-TW" altLang="en-US"/>
           </a:p>
@@ -4563,7 +4563,7 @@
             <a:fld id="{A4F910E6-8D00-4BAF-8C48-9688E0B449D3}" type="datetime1">
               <a:rPr lang="zh-TW" altLang="en-US" smtClean="0"/>
               <a:pPr/>
-              <a:t>2020/4/15</a:t>
+              <a:t>2020/4/20</a:t>
             </a:fld>
             <a:endParaRPr lang="zh-TW" altLang="en-US"/>
           </a:p>
@@ -4879,7 +4879,7 @@
             <a:fld id="{A4F910E6-8D00-4BAF-8C48-9688E0B449D3}" type="datetime1">
               <a:rPr lang="zh-TW" altLang="en-US" smtClean="0"/>
               <a:pPr/>
-              <a:t>2020/4/15</a:t>
+              <a:t>2020/4/20</a:t>
             </a:fld>
             <a:endParaRPr lang="zh-TW" altLang="en-US"/>
           </a:p>
@@ -5056,7 +5056,7 @@
             <a:fld id="{4E46BE27-E923-4EC2-B046-3272AE2A3E5C}" type="datetime1">
               <a:rPr lang="zh-TW" altLang="en-US" smtClean="0"/>
               <a:pPr/>
-              <a:t>2020/4/15</a:t>
+              <a:t>2020/4/20</a:t>
             </a:fld>
             <a:endParaRPr lang="zh-TW" altLang="en-US"/>
           </a:p>

</xml_diff>